<commit_message>
backup  banco,fluxogramas e esquema logico do banco
</commit_message>
<xml_diff>
--- a/imagens/fluxograma.pptx
+++ b/imagens/fluxograma.pptx
@@ -54,7 +54,7 @@
       </p:grpSpPr>
       <p:sp>
         <p:nvSpPr>
-          <p:cNvPr id="26" name="PlaceHolder 1"/>
+          <p:cNvPr id="23" name="PlaceHolder 1"/>
           <p:cNvSpPr>
             <a:spLocks noGrp="1"/>
           </p:cNvSpPr>
@@ -65,7 +65,7 @@
         <p:spPr>
           <a:xfrm>
             <a:off x="504000" y="226080"/>
-            <a:ext cx="9071640" cy="946440"/>
+            <a:ext cx="9072000" cy="946440"/>
           </a:xfrm>
           <a:prstGeom prst="rect">
             <a:avLst/>
@@ -83,7 +83,7 @@
       </p:sp>
       <p:sp>
         <p:nvSpPr>
-          <p:cNvPr id="27" name="PlaceHolder 2"/>
+          <p:cNvPr id="24" name="PlaceHolder 2"/>
           <p:cNvSpPr>
             <a:spLocks noGrp="1"/>
           </p:cNvSpPr>
@@ -94,7 +94,7 @@
         <p:spPr>
           <a:xfrm>
             <a:off x="504000" y="1326600"/>
-            <a:ext cx="9071640" cy="1568160"/>
+            <a:ext cx="9072000" cy="1568520"/>
           </a:xfrm>
           <a:prstGeom prst="rect">
             <a:avLst/>
@@ -113,7 +113,7 @@
       </p:sp>
       <p:sp>
         <p:nvSpPr>
-          <p:cNvPr id="28" name="PlaceHolder 3"/>
+          <p:cNvPr id="25" name="PlaceHolder 3"/>
           <p:cNvSpPr>
             <a:spLocks noGrp="1"/>
           </p:cNvSpPr>
@@ -123,8 +123,8 @@
         </p:nvSpPr>
         <p:spPr>
           <a:xfrm>
-            <a:off x="504000" y="3044160"/>
-            <a:ext cx="9071640" cy="1568160"/>
+            <a:off x="504000" y="3044520"/>
+            <a:ext cx="9072000" cy="1568520"/>
           </a:xfrm>
           <a:prstGeom prst="rect">
             <a:avLst/>
@@ -165,7 +165,7 @@
       </p:grpSpPr>
       <p:sp>
         <p:nvSpPr>
-          <p:cNvPr id="29" name="PlaceHolder 1"/>
+          <p:cNvPr id="26" name="PlaceHolder 1"/>
           <p:cNvSpPr>
             <a:spLocks noGrp="1"/>
           </p:cNvSpPr>
@@ -176,7 +176,7 @@
         <p:spPr>
           <a:xfrm>
             <a:off x="504000" y="226080"/>
-            <a:ext cx="9071640" cy="946440"/>
+            <a:ext cx="9072000" cy="946440"/>
           </a:xfrm>
           <a:prstGeom prst="rect">
             <a:avLst/>
@@ -194,7 +194,7 @@
       </p:sp>
       <p:sp>
         <p:nvSpPr>
-          <p:cNvPr id="30" name="PlaceHolder 2"/>
+          <p:cNvPr id="27" name="PlaceHolder 2"/>
           <p:cNvSpPr>
             <a:spLocks noGrp="1"/>
           </p:cNvSpPr>
@@ -205,7 +205,7 @@
         <p:spPr>
           <a:xfrm>
             <a:off x="504000" y="1326600"/>
-            <a:ext cx="4426920" cy="1568160"/>
+            <a:ext cx="4426920" cy="1568520"/>
           </a:xfrm>
           <a:prstGeom prst="rect">
             <a:avLst/>
@@ -224,7 +224,7 @@
       </p:sp>
       <p:sp>
         <p:nvSpPr>
-          <p:cNvPr id="31" name="PlaceHolder 3"/>
+          <p:cNvPr id="28" name="PlaceHolder 3"/>
           <p:cNvSpPr>
             <a:spLocks noGrp="1"/>
           </p:cNvSpPr>
@@ -235,7 +235,7 @@
         <p:spPr>
           <a:xfrm>
             <a:off x="5152680" y="1326600"/>
-            <a:ext cx="4426920" cy="1568160"/>
+            <a:ext cx="4426920" cy="1568520"/>
           </a:xfrm>
           <a:prstGeom prst="rect">
             <a:avLst/>
@@ -254,7 +254,7 @@
       </p:sp>
       <p:sp>
         <p:nvSpPr>
-          <p:cNvPr id="32" name="PlaceHolder 4"/>
+          <p:cNvPr id="29" name="PlaceHolder 4"/>
           <p:cNvSpPr>
             <a:spLocks noGrp="1"/>
           </p:cNvSpPr>
@@ -264,8 +264,8 @@
         </p:nvSpPr>
         <p:spPr>
           <a:xfrm>
-            <a:off x="504000" y="3044160"/>
-            <a:ext cx="4426920" cy="1568160"/>
+            <a:off x="504000" y="3044520"/>
+            <a:ext cx="4426920" cy="1568520"/>
           </a:xfrm>
           <a:prstGeom prst="rect">
             <a:avLst/>
@@ -284,7 +284,7 @@
       </p:sp>
       <p:sp>
         <p:nvSpPr>
-          <p:cNvPr id="33" name="PlaceHolder 5"/>
+          <p:cNvPr id="30" name="PlaceHolder 5"/>
           <p:cNvSpPr>
             <a:spLocks noGrp="1"/>
           </p:cNvSpPr>
@@ -294,8 +294,8 @@
         </p:nvSpPr>
         <p:spPr>
           <a:xfrm>
-            <a:off x="5152680" y="3044160"/>
-            <a:ext cx="4426920" cy="1568160"/>
+            <a:off x="5152680" y="3044520"/>
+            <a:ext cx="4426920" cy="1568520"/>
           </a:xfrm>
           <a:prstGeom prst="rect">
             <a:avLst/>
@@ -336,7 +336,7 @@
       </p:grpSpPr>
       <p:sp>
         <p:nvSpPr>
-          <p:cNvPr id="34" name="PlaceHolder 1"/>
+          <p:cNvPr id="31" name="PlaceHolder 1"/>
           <p:cNvSpPr>
             <a:spLocks noGrp="1"/>
           </p:cNvSpPr>
@@ -347,7 +347,7 @@
         <p:spPr>
           <a:xfrm>
             <a:off x="504000" y="226080"/>
-            <a:ext cx="9071640" cy="946440"/>
+            <a:ext cx="9072000" cy="946440"/>
           </a:xfrm>
           <a:prstGeom prst="rect">
             <a:avLst/>
@@ -365,7 +365,7 @@
       </p:sp>
       <p:sp>
         <p:nvSpPr>
-          <p:cNvPr id="35" name="PlaceHolder 2"/>
+          <p:cNvPr id="32" name="PlaceHolder 2"/>
           <p:cNvSpPr>
             <a:spLocks noGrp="1"/>
           </p:cNvSpPr>
@@ -376,7 +376,7 @@
         <p:spPr>
           <a:xfrm>
             <a:off x="504000" y="1326600"/>
-            <a:ext cx="2920680" cy="1568160"/>
+            <a:ext cx="2921040" cy="1568520"/>
           </a:xfrm>
           <a:prstGeom prst="rect">
             <a:avLst/>
@@ -395,7 +395,7 @@
       </p:sp>
       <p:sp>
         <p:nvSpPr>
-          <p:cNvPr id="36" name="PlaceHolder 3"/>
+          <p:cNvPr id="33" name="PlaceHolder 3"/>
           <p:cNvSpPr>
             <a:spLocks noGrp="1"/>
           </p:cNvSpPr>
@@ -405,8 +405,8 @@
         </p:nvSpPr>
         <p:spPr>
           <a:xfrm>
-            <a:off x="3571200" y="1326600"/>
-            <a:ext cx="2920680" cy="1568160"/>
+            <a:off x="3571560" y="1326600"/>
+            <a:ext cx="2921040" cy="1568520"/>
           </a:xfrm>
           <a:prstGeom prst="rect">
             <a:avLst/>
@@ -425,7 +425,7 @@
       </p:sp>
       <p:sp>
         <p:nvSpPr>
-          <p:cNvPr id="37" name="PlaceHolder 4"/>
+          <p:cNvPr id="34" name="PlaceHolder 4"/>
           <p:cNvSpPr>
             <a:spLocks noGrp="1"/>
           </p:cNvSpPr>
@@ -435,8 +435,8 @@
         </p:nvSpPr>
         <p:spPr>
           <a:xfrm>
-            <a:off x="6638040" y="1326600"/>
-            <a:ext cx="2920680" cy="1568160"/>
+            <a:off x="6639120" y="1326600"/>
+            <a:ext cx="2921040" cy="1568520"/>
           </a:xfrm>
           <a:prstGeom prst="rect">
             <a:avLst/>
@@ -455,7 +455,7 @@
       </p:sp>
       <p:sp>
         <p:nvSpPr>
-          <p:cNvPr id="38" name="PlaceHolder 5"/>
+          <p:cNvPr id="35" name="PlaceHolder 5"/>
           <p:cNvSpPr>
             <a:spLocks noGrp="1"/>
           </p:cNvSpPr>
@@ -465,8 +465,8 @@
         </p:nvSpPr>
         <p:spPr>
           <a:xfrm>
-            <a:off x="504000" y="3044160"/>
-            <a:ext cx="2920680" cy="1568160"/>
+            <a:off x="504000" y="3044520"/>
+            <a:ext cx="2921040" cy="1568520"/>
           </a:xfrm>
           <a:prstGeom prst="rect">
             <a:avLst/>
@@ -485,7 +485,7 @@
       </p:sp>
       <p:sp>
         <p:nvSpPr>
-          <p:cNvPr id="39" name="PlaceHolder 6"/>
+          <p:cNvPr id="36" name="PlaceHolder 6"/>
           <p:cNvSpPr>
             <a:spLocks noGrp="1"/>
           </p:cNvSpPr>
@@ -495,8 +495,8 @@
         </p:nvSpPr>
         <p:spPr>
           <a:xfrm>
-            <a:off x="3571200" y="3044160"/>
-            <a:ext cx="2920680" cy="1568160"/>
+            <a:off x="3571560" y="3044520"/>
+            <a:ext cx="2921040" cy="1568520"/>
           </a:xfrm>
           <a:prstGeom prst="rect">
             <a:avLst/>
@@ -515,7 +515,7 @@
       </p:sp>
       <p:sp>
         <p:nvSpPr>
-          <p:cNvPr id="40" name="PlaceHolder 7"/>
+          <p:cNvPr id="37" name="PlaceHolder 7"/>
           <p:cNvSpPr>
             <a:spLocks noGrp="1"/>
           </p:cNvSpPr>
@@ -525,8 +525,8 @@
         </p:nvSpPr>
         <p:spPr>
           <a:xfrm>
-            <a:off x="6638040" y="3044160"/>
-            <a:ext cx="2920680" cy="1568160"/>
+            <a:off x="6639120" y="3044520"/>
+            <a:ext cx="2921040" cy="1568520"/>
           </a:xfrm>
           <a:prstGeom prst="rect">
             <a:avLst/>
@@ -567,7 +567,7 @@
       </p:grpSpPr>
       <p:sp>
         <p:nvSpPr>
-          <p:cNvPr id="5" name="PlaceHolder 1"/>
+          <p:cNvPr id="2" name="PlaceHolder 1"/>
           <p:cNvSpPr>
             <a:spLocks noGrp="1"/>
           </p:cNvSpPr>
@@ -578,7 +578,7 @@
         <p:spPr>
           <a:xfrm>
             <a:off x="504000" y="226080"/>
-            <a:ext cx="9071640" cy="946440"/>
+            <a:ext cx="9072000" cy="946440"/>
           </a:xfrm>
           <a:prstGeom prst="rect">
             <a:avLst/>
@@ -596,7 +596,7 @@
       </p:sp>
       <p:sp>
         <p:nvSpPr>
-          <p:cNvPr id="6" name="PlaceHolder 2"/>
+          <p:cNvPr id="3" name="PlaceHolder 2"/>
           <p:cNvSpPr>
             <a:spLocks noGrp="1"/>
           </p:cNvSpPr>
@@ -607,7 +607,7 @@
         <p:spPr>
           <a:xfrm>
             <a:off x="504000" y="1326600"/>
-            <a:ext cx="9071640" cy="3288240"/>
+            <a:ext cx="9072000" cy="3288600"/>
           </a:xfrm>
           <a:prstGeom prst="rect">
             <a:avLst/>
@@ -647,7 +647,7 @@
       </p:grpSpPr>
       <p:sp>
         <p:nvSpPr>
-          <p:cNvPr id="7" name="PlaceHolder 1"/>
+          <p:cNvPr id="4" name="PlaceHolder 1"/>
           <p:cNvSpPr>
             <a:spLocks noGrp="1"/>
           </p:cNvSpPr>
@@ -658,7 +658,7 @@
         <p:spPr>
           <a:xfrm>
             <a:off x="504000" y="226080"/>
-            <a:ext cx="9071640" cy="946440"/>
+            <a:ext cx="9072000" cy="946440"/>
           </a:xfrm>
           <a:prstGeom prst="rect">
             <a:avLst/>
@@ -676,7 +676,7 @@
       </p:sp>
       <p:sp>
         <p:nvSpPr>
-          <p:cNvPr id="8" name="PlaceHolder 2"/>
+          <p:cNvPr id="5" name="PlaceHolder 2"/>
           <p:cNvSpPr>
             <a:spLocks noGrp="1"/>
           </p:cNvSpPr>
@@ -687,7 +687,7 @@
         <p:spPr>
           <a:xfrm>
             <a:off x="504000" y="1326600"/>
-            <a:ext cx="9071640" cy="3288240"/>
+            <a:ext cx="9072000" cy="3288600"/>
           </a:xfrm>
           <a:prstGeom prst="rect">
             <a:avLst/>
@@ -728,7 +728,7 @@
       </p:grpSpPr>
       <p:sp>
         <p:nvSpPr>
-          <p:cNvPr id="9" name="PlaceHolder 1"/>
+          <p:cNvPr id="6" name="PlaceHolder 1"/>
           <p:cNvSpPr>
             <a:spLocks noGrp="1"/>
           </p:cNvSpPr>
@@ -739,7 +739,7 @@
         <p:spPr>
           <a:xfrm>
             <a:off x="504000" y="226080"/>
-            <a:ext cx="9071640" cy="946440"/>
+            <a:ext cx="9072000" cy="946440"/>
           </a:xfrm>
           <a:prstGeom prst="rect">
             <a:avLst/>
@@ -757,7 +757,7 @@
       </p:sp>
       <p:sp>
         <p:nvSpPr>
-          <p:cNvPr id="10" name="PlaceHolder 2"/>
+          <p:cNvPr id="7" name="PlaceHolder 2"/>
           <p:cNvSpPr>
             <a:spLocks noGrp="1"/>
           </p:cNvSpPr>
@@ -768,7 +768,7 @@
         <p:spPr>
           <a:xfrm>
             <a:off x="504000" y="1326600"/>
-            <a:ext cx="4426920" cy="3288240"/>
+            <a:ext cx="4426920" cy="3288600"/>
           </a:xfrm>
           <a:prstGeom prst="rect">
             <a:avLst/>
@@ -787,7 +787,7 @@
       </p:sp>
       <p:sp>
         <p:nvSpPr>
-          <p:cNvPr id="11" name="PlaceHolder 3"/>
+          <p:cNvPr id="8" name="PlaceHolder 3"/>
           <p:cNvSpPr>
             <a:spLocks noGrp="1"/>
           </p:cNvSpPr>
@@ -798,7 +798,7 @@
         <p:spPr>
           <a:xfrm>
             <a:off x="5152680" y="1326600"/>
-            <a:ext cx="4426920" cy="3288240"/>
+            <a:ext cx="4426920" cy="3288600"/>
           </a:xfrm>
           <a:prstGeom prst="rect">
             <a:avLst/>
@@ -839,7 +839,7 @@
       </p:grpSpPr>
       <p:sp>
         <p:nvSpPr>
-          <p:cNvPr id="12" name="PlaceHolder 1"/>
+          <p:cNvPr id="9" name="PlaceHolder 1"/>
           <p:cNvSpPr>
             <a:spLocks noGrp="1"/>
           </p:cNvSpPr>
@@ -850,7 +850,7 @@
         <p:spPr>
           <a:xfrm>
             <a:off x="504000" y="226080"/>
-            <a:ext cx="9071640" cy="946440"/>
+            <a:ext cx="9072000" cy="946440"/>
           </a:xfrm>
           <a:prstGeom prst="rect">
             <a:avLst/>
@@ -890,7 +890,7 @@
       </p:grpSpPr>
       <p:sp>
         <p:nvSpPr>
-          <p:cNvPr id="13" name="PlaceHolder 1"/>
+          <p:cNvPr id="10" name="PlaceHolder 1"/>
           <p:cNvSpPr>
             <a:spLocks noGrp="1"/>
           </p:cNvSpPr>
@@ -901,7 +901,7 @@
         <p:spPr>
           <a:xfrm>
             <a:off x="504000" y="226080"/>
-            <a:ext cx="9071640" cy="4388400"/>
+            <a:ext cx="9072000" cy="4388400"/>
           </a:xfrm>
           <a:prstGeom prst="rect">
             <a:avLst/>
@@ -941,7 +941,7 @@
       </p:grpSpPr>
       <p:sp>
         <p:nvSpPr>
-          <p:cNvPr id="14" name="PlaceHolder 1"/>
+          <p:cNvPr id="11" name="PlaceHolder 1"/>
           <p:cNvSpPr>
             <a:spLocks noGrp="1"/>
           </p:cNvSpPr>
@@ -952,7 +952,7 @@
         <p:spPr>
           <a:xfrm>
             <a:off x="504000" y="226080"/>
-            <a:ext cx="9071640" cy="946440"/>
+            <a:ext cx="9072000" cy="946440"/>
           </a:xfrm>
           <a:prstGeom prst="rect">
             <a:avLst/>
@@ -970,7 +970,7 @@
       </p:sp>
       <p:sp>
         <p:nvSpPr>
-          <p:cNvPr id="15" name="PlaceHolder 2"/>
+          <p:cNvPr id="12" name="PlaceHolder 2"/>
           <p:cNvSpPr>
             <a:spLocks noGrp="1"/>
           </p:cNvSpPr>
@@ -981,7 +981,7 @@
         <p:spPr>
           <a:xfrm>
             <a:off x="504000" y="1326600"/>
-            <a:ext cx="4426920" cy="1568160"/>
+            <a:ext cx="4426920" cy="1568520"/>
           </a:xfrm>
           <a:prstGeom prst="rect">
             <a:avLst/>
@@ -1000,7 +1000,7 @@
       </p:sp>
       <p:sp>
         <p:nvSpPr>
-          <p:cNvPr id="16" name="PlaceHolder 3"/>
+          <p:cNvPr id="13" name="PlaceHolder 3"/>
           <p:cNvSpPr>
             <a:spLocks noGrp="1"/>
           </p:cNvSpPr>
@@ -1011,7 +1011,7 @@
         <p:spPr>
           <a:xfrm>
             <a:off x="5152680" y="1326600"/>
-            <a:ext cx="4426920" cy="3288240"/>
+            <a:ext cx="4426920" cy="3288600"/>
           </a:xfrm>
           <a:prstGeom prst="rect">
             <a:avLst/>
@@ -1030,7 +1030,7 @@
       </p:sp>
       <p:sp>
         <p:nvSpPr>
-          <p:cNvPr id="17" name="PlaceHolder 4"/>
+          <p:cNvPr id="14" name="PlaceHolder 4"/>
           <p:cNvSpPr>
             <a:spLocks noGrp="1"/>
           </p:cNvSpPr>
@@ -1040,8 +1040,8 @@
         </p:nvSpPr>
         <p:spPr>
           <a:xfrm>
-            <a:off x="504000" y="3044160"/>
-            <a:ext cx="4426920" cy="1568160"/>
+            <a:off x="504000" y="3044520"/>
+            <a:ext cx="4426920" cy="1568520"/>
           </a:xfrm>
           <a:prstGeom prst="rect">
             <a:avLst/>
@@ -1082,7 +1082,7 @@
       </p:grpSpPr>
       <p:sp>
         <p:nvSpPr>
-          <p:cNvPr id="18" name="PlaceHolder 1"/>
+          <p:cNvPr id="15" name="PlaceHolder 1"/>
           <p:cNvSpPr>
             <a:spLocks noGrp="1"/>
           </p:cNvSpPr>
@@ -1093,7 +1093,7 @@
         <p:spPr>
           <a:xfrm>
             <a:off x="504000" y="226080"/>
-            <a:ext cx="9071640" cy="946440"/>
+            <a:ext cx="9072000" cy="946440"/>
           </a:xfrm>
           <a:prstGeom prst="rect">
             <a:avLst/>
@@ -1111,7 +1111,7 @@
       </p:sp>
       <p:sp>
         <p:nvSpPr>
-          <p:cNvPr id="19" name="PlaceHolder 2"/>
+          <p:cNvPr id="16" name="PlaceHolder 2"/>
           <p:cNvSpPr>
             <a:spLocks noGrp="1"/>
           </p:cNvSpPr>
@@ -1122,7 +1122,7 @@
         <p:spPr>
           <a:xfrm>
             <a:off x="504000" y="1326600"/>
-            <a:ext cx="4426920" cy="3288240"/>
+            <a:ext cx="4426920" cy="3288600"/>
           </a:xfrm>
           <a:prstGeom prst="rect">
             <a:avLst/>
@@ -1141,7 +1141,7 @@
       </p:sp>
       <p:sp>
         <p:nvSpPr>
-          <p:cNvPr id="20" name="PlaceHolder 3"/>
+          <p:cNvPr id="17" name="PlaceHolder 3"/>
           <p:cNvSpPr>
             <a:spLocks noGrp="1"/>
           </p:cNvSpPr>
@@ -1152,7 +1152,7 @@
         <p:spPr>
           <a:xfrm>
             <a:off x="5152680" y="1326600"/>
-            <a:ext cx="4426920" cy="1568160"/>
+            <a:ext cx="4426920" cy="1568520"/>
           </a:xfrm>
           <a:prstGeom prst="rect">
             <a:avLst/>
@@ -1171,7 +1171,7 @@
       </p:sp>
       <p:sp>
         <p:nvSpPr>
-          <p:cNvPr id="21" name="PlaceHolder 4"/>
+          <p:cNvPr id="18" name="PlaceHolder 4"/>
           <p:cNvSpPr>
             <a:spLocks noGrp="1"/>
           </p:cNvSpPr>
@@ -1181,8 +1181,8 @@
         </p:nvSpPr>
         <p:spPr>
           <a:xfrm>
-            <a:off x="5152680" y="3044160"/>
-            <a:ext cx="4426920" cy="1568160"/>
+            <a:off x="5152680" y="3044520"/>
+            <a:ext cx="4426920" cy="1568520"/>
           </a:xfrm>
           <a:prstGeom prst="rect">
             <a:avLst/>
@@ -1223,7 +1223,7 @@
       </p:grpSpPr>
       <p:sp>
         <p:nvSpPr>
-          <p:cNvPr id="22" name="PlaceHolder 1"/>
+          <p:cNvPr id="19" name="PlaceHolder 1"/>
           <p:cNvSpPr>
             <a:spLocks noGrp="1"/>
           </p:cNvSpPr>
@@ -1234,7 +1234,7 @@
         <p:spPr>
           <a:xfrm>
             <a:off x="504000" y="226080"/>
-            <a:ext cx="9071640" cy="946440"/>
+            <a:ext cx="9072000" cy="946440"/>
           </a:xfrm>
           <a:prstGeom prst="rect">
             <a:avLst/>
@@ -1252,7 +1252,7 @@
       </p:sp>
       <p:sp>
         <p:nvSpPr>
-          <p:cNvPr id="23" name="PlaceHolder 2"/>
+          <p:cNvPr id="20" name="PlaceHolder 2"/>
           <p:cNvSpPr>
             <a:spLocks noGrp="1"/>
           </p:cNvSpPr>
@@ -1263,7 +1263,7 @@
         <p:spPr>
           <a:xfrm>
             <a:off x="504000" y="1326600"/>
-            <a:ext cx="4426920" cy="1568160"/>
+            <a:ext cx="4426920" cy="1568520"/>
           </a:xfrm>
           <a:prstGeom prst="rect">
             <a:avLst/>
@@ -1282,7 +1282,7 @@
       </p:sp>
       <p:sp>
         <p:nvSpPr>
-          <p:cNvPr id="24" name="PlaceHolder 3"/>
+          <p:cNvPr id="21" name="PlaceHolder 3"/>
           <p:cNvSpPr>
             <a:spLocks noGrp="1"/>
           </p:cNvSpPr>
@@ -1293,7 +1293,7 @@
         <p:spPr>
           <a:xfrm>
             <a:off x="5152680" y="1326600"/>
-            <a:ext cx="4426920" cy="1568160"/>
+            <a:ext cx="4426920" cy="1568520"/>
           </a:xfrm>
           <a:prstGeom prst="rect">
             <a:avLst/>
@@ -1312,7 +1312,7 @@
       </p:sp>
       <p:sp>
         <p:nvSpPr>
-          <p:cNvPr id="25" name="PlaceHolder 4"/>
+          <p:cNvPr id="22" name="PlaceHolder 4"/>
           <p:cNvSpPr>
             <a:spLocks noGrp="1"/>
           </p:cNvSpPr>
@@ -1322,8 +1322,8 @@
         </p:nvSpPr>
         <p:spPr>
           <a:xfrm>
-            <a:off x="504000" y="3044160"/>
-            <a:ext cx="9071640" cy="1568160"/>
+            <a:off x="504000" y="3044520"/>
+            <a:ext cx="9072000" cy="1568520"/>
           </a:xfrm>
           <a:prstGeom prst="rect">
             <a:avLst/>
@@ -1375,7 +1375,7 @@
         <p:spPr>
           <a:xfrm>
             <a:off x="504000" y="226080"/>
-            <a:ext cx="9071640" cy="946440"/>
+            <a:ext cx="9072000" cy="946440"/>
           </a:xfrm>
           <a:prstGeom prst="rect">
             <a:avLst/>
@@ -1410,7 +1410,7 @@
         <p:spPr>
           <a:xfrm>
             <a:off x="504000" y="1326600"/>
-            <a:ext cx="9071640" cy="3288240"/>
+            <a:ext cx="9072000" cy="3288600"/>
           </a:xfrm>
           <a:prstGeom prst="rect">
             <a:avLst/>
@@ -1572,110 +1572,6 @@
             </a:r>
             <a:endParaRPr b="0" lang="pt-BR" sz="2000" spc="-1" strike="noStrike">
               <a:latin typeface="Arial"/>
-            </a:endParaRPr>
-          </a:p>
-        </p:txBody>
-      </p:sp>
-      <p:sp>
-        <p:nvSpPr>
-          <p:cNvPr id="2" name="PlaceHolder 3"/>
-          <p:cNvSpPr>
-            <a:spLocks noGrp="1"/>
-          </p:cNvSpPr>
-          <p:nvPr>
-            <p:ph type="dt"/>
-          </p:nvPr>
-        </p:nvSpPr>
-        <p:spPr>
-          <a:xfrm>
-            <a:off x="504000" y="5165280"/>
-            <a:ext cx="2348280" cy="390600"/>
-          </a:xfrm>
-          <a:prstGeom prst="rect">
-            <a:avLst/>
-          </a:prstGeom>
-        </p:spPr>
-        <p:txBody>
-          <a:bodyPr lIns="0" rIns="0" tIns="0" bIns="0"/>
-          <a:p>
-            <a:r>
-              <a:rPr b="0" lang="pt-BR" sz="1400" spc="-1" strike="noStrike">
-                <a:latin typeface="Times New Roman"/>
-              </a:rPr>
-              <a:t> </a:t>
-            </a:r>
-            <a:endParaRPr b="0" lang="pt-BR" sz="1400" spc="-1" strike="noStrike">
-              <a:latin typeface="Times New Roman"/>
-            </a:endParaRPr>
-          </a:p>
-        </p:txBody>
-      </p:sp>
-      <p:sp>
-        <p:nvSpPr>
-          <p:cNvPr id="3" name="PlaceHolder 4"/>
-          <p:cNvSpPr>
-            <a:spLocks noGrp="1"/>
-          </p:cNvSpPr>
-          <p:nvPr>
-            <p:ph type="ftr"/>
-          </p:nvPr>
-        </p:nvSpPr>
-        <p:spPr>
-          <a:xfrm>
-            <a:off x="3447360" y="5165280"/>
-            <a:ext cx="3195000" cy="390600"/>
-          </a:xfrm>
-          <a:prstGeom prst="rect">
-            <a:avLst/>
-          </a:prstGeom>
-        </p:spPr>
-        <p:txBody>
-          <a:bodyPr lIns="0" rIns="0" tIns="0" bIns="0"/>
-          <a:p>
-            <a:pPr algn="ctr"/>
-            <a:r>
-              <a:rPr b="0" lang="pt-BR" sz="1400" spc="-1" strike="noStrike">
-                <a:latin typeface="Times New Roman"/>
-              </a:rPr>
-              <a:t> </a:t>
-            </a:r>
-            <a:endParaRPr b="0" lang="pt-BR" sz="1400" spc="-1" strike="noStrike">
-              <a:latin typeface="Times New Roman"/>
-            </a:endParaRPr>
-          </a:p>
-        </p:txBody>
-      </p:sp>
-      <p:sp>
-        <p:nvSpPr>
-          <p:cNvPr id="4" name="PlaceHolder 5"/>
-          <p:cNvSpPr>
-            <a:spLocks noGrp="1"/>
-          </p:cNvSpPr>
-          <p:nvPr>
-            <p:ph type="sldNum"/>
-          </p:nvPr>
-        </p:nvSpPr>
-        <p:spPr>
-          <a:xfrm>
-            <a:off x="7227360" y="5165280"/>
-            <a:ext cx="2348280" cy="390600"/>
-          </a:xfrm>
-          <a:prstGeom prst="rect">
-            <a:avLst/>
-          </a:prstGeom>
-        </p:spPr>
-        <p:txBody>
-          <a:bodyPr lIns="0" rIns="0" tIns="0" bIns="0"/>
-          <a:p>
-            <a:pPr algn="r"/>
-            <a:fld id="{B50EFCCE-57DD-48FA-AFF9-DCEF957A8902}" type="slidenum">
-              <a:rPr b="0" lang="pt-BR" sz="1400" spc="-1" strike="noStrike">
-                <a:latin typeface="Times New Roman"/>
-              </a:rPr>
-              <a:t>2</a:t>
-            </a:fld>
-            <a:endParaRPr b="0" lang="pt-BR" sz="1400" spc="-1" strike="noStrike">
-              <a:latin typeface="Times New Roman"/>
             </a:endParaRPr>
           </a:p>
         </p:txBody>
@@ -1719,20 +1615,20 @@
       </p:grpSpPr>
       <p:sp>
         <p:nvSpPr>
-          <p:cNvPr id="41" name="CustomShape 1"/>
+          <p:cNvPr id="38" name="CustomShape 1"/>
           <p:cNvSpPr/>
           <p:nvPr/>
         </p:nvSpPr>
         <p:spPr>
           <a:xfrm>
             <a:off x="2376000" y="108000"/>
-            <a:ext cx="1800000" cy="648000"/>
+            <a:ext cx="1799640" cy="647640"/>
           </a:xfrm>
           <a:custGeom>
             <a:avLst/>
             <a:gdLst/>
             <a:ahLst/>
-            <a:rect l="0" t="0" r="r" b="b"/>
+            <a:rect l="l" t="t" r="r" b="b"/>
             <a:pathLst>
               <a:path w="5002" h="1801">
                 <a:moveTo>
@@ -1791,10 +1687,18 @@
         <p:txBody>
           <a:bodyPr wrap="none" lIns="90000" rIns="90000" tIns="45000" bIns="45000" anchor="ctr"/>
           <a:p>
-            <a:pPr algn="ctr"/>
+            <a:pPr algn="ctr">
+              <a:lnSpc>
+                <a:spcPct val="100000"/>
+              </a:lnSpc>
+            </a:pPr>
             <a:r>
               <a:rPr b="0" lang="pt-BR" sz="1800" spc="-1" strike="noStrike">
+                <a:solidFill>
+                  <a:srgbClr val="000000"/>
+                </a:solidFill>
                 <a:latin typeface="Arial"/>
+                <a:ea typeface="DejaVu Sans"/>
               </a:rPr>
               <a:t>inicio/fim</a:t>
             </a:r>
@@ -1806,14 +1710,14 @@
       </p:sp>
       <p:sp>
         <p:nvSpPr>
-          <p:cNvPr id="42" name="CustomShape 2"/>
+          <p:cNvPr id="39" name="CustomShape 2"/>
           <p:cNvSpPr/>
           <p:nvPr/>
         </p:nvSpPr>
         <p:spPr>
           <a:xfrm>
-            <a:off x="2448000" y="1127160"/>
-            <a:ext cx="1872000" cy="636840"/>
+            <a:off x="2376360" y="1296000"/>
+            <a:ext cx="1871640" cy="532800"/>
           </a:xfrm>
           <a:prstGeom prst="rect">
             <a:avLst/>
@@ -1836,10 +1740,18 @@
         <p:txBody>
           <a:bodyPr wrap="none" lIns="90000" rIns="90000" tIns="45000" bIns="45000" anchor="ctr"/>
           <a:p>
-            <a:pPr algn="ctr"/>
+            <a:pPr algn="ctr">
+              <a:lnSpc>
+                <a:spcPct val="100000"/>
+              </a:lnSpc>
+            </a:pPr>
             <a:r>
               <a:rPr b="0" lang="pt-BR" sz="1800" spc="-1" strike="noStrike">
+                <a:solidFill>
+                  <a:srgbClr val="000000"/>
+                </a:solidFill>
                 <a:latin typeface="Arial"/>
+                <a:ea typeface="DejaVu Sans"/>
               </a:rPr>
               <a:t>Entrada</a:t>
             </a:r>
@@ -1851,14 +1763,14 @@
       </p:sp>
       <p:sp>
         <p:nvSpPr>
-          <p:cNvPr id="43" name="CustomShape 3"/>
+          <p:cNvPr id="40" name="CustomShape 3"/>
           <p:cNvSpPr/>
           <p:nvPr/>
         </p:nvSpPr>
         <p:spPr>
           <a:xfrm>
             <a:off x="2088000" y="2196000"/>
-            <a:ext cx="2088000" cy="864000"/>
+            <a:ext cx="2087640" cy="863640"/>
           </a:xfrm>
           <a:prstGeom prst="rect">
             <a:avLst/>
@@ -1881,10 +1793,18 @@
         <p:txBody>
           <a:bodyPr wrap="none" lIns="90000" rIns="90000" tIns="45000" bIns="45000" anchor="ctr"/>
           <a:p>
-            <a:pPr algn="ctr"/>
+            <a:pPr algn="ctr">
+              <a:lnSpc>
+                <a:spcPct val="100000"/>
+              </a:lnSpc>
+            </a:pPr>
             <a:r>
               <a:rPr b="0" lang="pt-BR" sz="1800" spc="-1" strike="noStrike">
+                <a:solidFill>
+                  <a:srgbClr val="000000"/>
+                </a:solidFill>
                 <a:latin typeface="Arial"/>
+                <a:ea typeface="DejaVu Sans"/>
               </a:rPr>
               <a:t>Processamento</a:t>
             </a:r>
@@ -1896,14 +1816,14 @@
       </p:sp>
       <p:sp>
         <p:nvSpPr>
-          <p:cNvPr id="44" name="CustomShape 4"/>
+          <p:cNvPr id="41" name="CustomShape 4"/>
           <p:cNvSpPr/>
           <p:nvPr/>
         </p:nvSpPr>
         <p:spPr>
           <a:xfrm>
             <a:off x="4608000" y="1512000"/>
-            <a:ext cx="1800000" cy="1440000"/>
+            <a:ext cx="1799640" cy="1439640"/>
           </a:xfrm>
           <a:custGeom>
             <a:avLst/>
@@ -1949,10 +1869,18 @@
         <p:txBody>
           <a:bodyPr wrap="none" lIns="90000" rIns="90000" tIns="45000" bIns="45000" anchor="ctr"/>
           <a:p>
-            <a:pPr algn="ctr"/>
+            <a:pPr algn="ctr">
+              <a:lnSpc>
+                <a:spcPct val="100000"/>
+              </a:lnSpc>
+            </a:pPr>
             <a:r>
               <a:rPr b="0" lang="pt-BR" sz="1800" spc="-1" strike="noStrike">
+                <a:solidFill>
+                  <a:srgbClr val="000000"/>
+                </a:solidFill>
                 <a:latin typeface="Arial"/>
+                <a:ea typeface="DejaVu Sans"/>
               </a:rPr>
               <a:t>Decisao</a:t>
             </a:r>
@@ -1961,10 +1889,18 @@
             </a:endParaRPr>
           </a:p>
           <a:p>
-            <a:pPr algn="ctr"/>
+            <a:pPr algn="ctr">
+              <a:lnSpc>
+                <a:spcPct val="100000"/>
+              </a:lnSpc>
+            </a:pPr>
             <a:r>
               <a:rPr b="0" lang="pt-BR" sz="1800" spc="-1" strike="noStrike">
+                <a:solidFill>
+                  <a:srgbClr val="000000"/>
+                </a:solidFill>
                 <a:latin typeface="Arial"/>
+                <a:ea typeface="DejaVu Sans"/>
               </a:rPr>
               <a:t>If( ) { }</a:t>
             </a:r>
@@ -1976,14 +1912,14 @@
       </p:sp>
       <p:sp>
         <p:nvSpPr>
-          <p:cNvPr id="45" name="CustomShape 5"/>
+          <p:cNvPr id="42" name="CustomShape 5"/>
           <p:cNvSpPr/>
           <p:nvPr/>
         </p:nvSpPr>
         <p:spPr>
           <a:xfrm>
             <a:off x="2160000" y="3420000"/>
-            <a:ext cx="1944000" cy="792000"/>
+            <a:ext cx="1943640" cy="791640"/>
           </a:xfrm>
           <a:prstGeom prst="foldedCorner">
             <a:avLst>
@@ -2008,10 +1944,18 @@
         <p:txBody>
           <a:bodyPr wrap="none" lIns="90000" rIns="90000" tIns="45000" bIns="45000" anchor="ctr"/>
           <a:p>
-            <a:pPr algn="ctr"/>
+            <a:pPr algn="ctr">
+              <a:lnSpc>
+                <a:spcPct val="100000"/>
+              </a:lnSpc>
+            </a:pPr>
             <a:r>
               <a:rPr b="0" lang="pt-BR" sz="1800" spc="-1" strike="noStrike">
+                <a:solidFill>
+                  <a:srgbClr val="000000"/>
+                </a:solidFill>
                 <a:latin typeface="Arial"/>
+                <a:ea typeface="DejaVu Sans"/>
               </a:rPr>
               <a:t>Saida</a:t>
             </a:r>
@@ -2023,28 +1967,28 @@
       </p:sp>
       <p:grpSp>
         <p:nvGrpSpPr>
-          <p:cNvPr id="46" name="Group 6"/>
+          <p:cNvPr id="43" name="Group 6"/>
           <p:cNvGrpSpPr/>
           <p:nvPr/>
         </p:nvGrpSpPr>
         <p:grpSpPr>
           <a:xfrm>
             <a:off x="6684120" y="1152000"/>
-            <a:ext cx="1739880" cy="418320"/>
+            <a:ext cx="1739520" cy="417960"/>
             <a:chOff x="6684120" y="1152000"/>
-            <a:chExt cx="1739880" cy="418320"/>
+            <a:chExt cx="1739520" cy="417960"/>
           </a:xfrm>
         </p:grpSpPr>
         <p:sp>
           <p:nvSpPr>
-            <p:cNvPr id="47" name="Line 7"/>
+            <p:cNvPr id="44" name="Line 7"/>
             <p:cNvSpPr/>
             <p:nvPr/>
           </p:nvSpPr>
           <p:spPr>
             <a:xfrm>
               <a:off x="6756120" y="1152000"/>
-              <a:ext cx="1584000" cy="0"/>
+              <a:ext cx="1584000" cy="360"/>
             </a:xfrm>
             <a:prstGeom prst="line">
               <a:avLst/>
@@ -2065,14 +2009,14 @@
         </p:sp>
         <p:sp>
           <p:nvSpPr>
-            <p:cNvPr id="48" name="TextShape 8"/>
-            <p:cNvSpPr txBox="1"/>
+            <p:cNvPr id="45" name="CustomShape 8"/>
+            <p:cNvSpPr/>
             <p:nvPr/>
           </p:nvSpPr>
           <p:spPr>
             <a:xfrm>
               <a:off x="6684120" y="1224000"/>
-              <a:ext cx="1739880" cy="346320"/>
+              <a:ext cx="1739520" cy="345960"/>
             </a:xfrm>
             <a:prstGeom prst="rect">
               <a:avLst/>
@@ -2082,9 +2026,20 @@
               <a:noFill/>
             </a:ln>
           </p:spPr>
+          <p:style>
+            <a:lnRef idx="0"/>
+            <a:fillRef idx="0"/>
+            <a:effectRef idx="0"/>
+            <a:fontRef idx="minor"/>
+          </p:style>
           <p:txBody>
             <a:bodyPr lIns="90000" rIns="90000" tIns="45000" bIns="45000"/>
             <a:p>
+              <a:pPr>
+                <a:lnSpc>
+                  <a:spcPct val="100000"/>
+                </a:lnSpc>
+              </a:pPr>
               <a:r>
                 <a:rPr b="0" lang="pt-BR" sz="1800" spc="-1" strike="noStrike">
                   <a:latin typeface="Arial"/>
@@ -2100,14 +2055,14 @@
       </p:grpSp>
       <p:sp>
         <p:nvSpPr>
-          <p:cNvPr id="49" name="Line 9"/>
+          <p:cNvPr id="46" name="Line 9"/>
           <p:cNvSpPr/>
           <p:nvPr/>
         </p:nvSpPr>
         <p:spPr>
           <a:xfrm>
             <a:off x="3240000" y="756000"/>
-            <a:ext cx="0" cy="432000"/>
+            <a:ext cx="360" cy="432000"/>
           </a:xfrm>
           <a:prstGeom prst="line">
             <a:avLst/>
@@ -2128,20 +2083,20 @@
       </p:sp>
       <p:sp>
         <p:nvSpPr>
-          <p:cNvPr id="50" name="CustomShape 10"/>
+          <p:cNvPr id="47" name="CustomShape 10"/>
           <p:cNvSpPr/>
           <p:nvPr/>
         </p:nvSpPr>
         <p:spPr>
           <a:xfrm>
             <a:off x="2232000" y="4572000"/>
-            <a:ext cx="1800000" cy="648000"/>
+            <a:ext cx="1799640" cy="647640"/>
           </a:xfrm>
           <a:custGeom>
             <a:avLst/>
             <a:gdLst/>
             <a:ahLst/>
-            <a:rect l="0" t="0" r="r" b="b"/>
+            <a:rect l="l" t="t" r="r" b="b"/>
             <a:pathLst>
               <a:path w="5002" h="1801">
                 <a:moveTo>
@@ -2200,10 +2155,18 @@
         <p:txBody>
           <a:bodyPr wrap="none" lIns="90000" rIns="90000" tIns="45000" bIns="45000" anchor="ctr"/>
           <a:p>
-            <a:pPr algn="ctr"/>
+            <a:pPr algn="ctr">
+              <a:lnSpc>
+                <a:spcPct val="100000"/>
+              </a:lnSpc>
+            </a:pPr>
             <a:r>
               <a:rPr b="0" lang="pt-BR" sz="1800" spc="-1" strike="noStrike">
+                <a:solidFill>
+                  <a:srgbClr val="000000"/>
+                </a:solidFill>
                 <a:latin typeface="Arial"/>
+                <a:ea typeface="DejaVu Sans"/>
               </a:rPr>
               <a:t>inicio/fim</a:t>
             </a:r>
@@ -2215,14 +2178,14 @@
       </p:sp>
       <p:sp>
         <p:nvSpPr>
-          <p:cNvPr id="51" name="Line 11"/>
+          <p:cNvPr id="48" name="Line 11"/>
           <p:cNvSpPr/>
           <p:nvPr/>
         </p:nvSpPr>
         <p:spPr>
           <a:xfrm>
             <a:off x="3240000" y="1800000"/>
-            <a:ext cx="0" cy="432000"/>
+            <a:ext cx="360" cy="432000"/>
           </a:xfrm>
           <a:prstGeom prst="line">
             <a:avLst/>
@@ -2243,14 +2206,14 @@
       </p:sp>
       <p:sp>
         <p:nvSpPr>
-          <p:cNvPr id="52" name="Line 12"/>
+          <p:cNvPr id="49" name="Line 12"/>
           <p:cNvSpPr/>
           <p:nvPr/>
         </p:nvSpPr>
         <p:spPr>
           <a:xfrm>
             <a:off x="3240000" y="3024000"/>
-            <a:ext cx="0" cy="432000"/>
+            <a:ext cx="360" cy="432000"/>
           </a:xfrm>
           <a:prstGeom prst="line">
             <a:avLst/>
@@ -2271,14 +2234,14 @@
       </p:sp>
       <p:sp>
         <p:nvSpPr>
-          <p:cNvPr id="53" name="Line 13"/>
+          <p:cNvPr id="50" name="Line 13"/>
           <p:cNvSpPr/>
           <p:nvPr/>
         </p:nvSpPr>
         <p:spPr>
           <a:xfrm>
             <a:off x="3240000" y="4176000"/>
-            <a:ext cx="0" cy="432000"/>
+            <a:ext cx="360" cy="432000"/>
           </a:xfrm>
           <a:prstGeom prst="line">
             <a:avLst/>
@@ -2348,20 +2311,20 @@
       </p:grpSpPr>
       <p:sp>
         <p:nvSpPr>
-          <p:cNvPr id="54" name="CustomShape 1"/>
+          <p:cNvPr id="51" name="CustomShape 1"/>
           <p:cNvSpPr/>
           <p:nvPr/>
         </p:nvSpPr>
         <p:spPr>
           <a:xfrm>
             <a:off x="2376000" y="-180000"/>
-            <a:ext cx="1800000" cy="648000"/>
+            <a:ext cx="1799640" cy="647640"/>
           </a:xfrm>
           <a:custGeom>
             <a:avLst/>
             <a:gdLst/>
             <a:ahLst/>
-            <a:rect l="0" t="0" r="r" b="b"/>
+            <a:rect l="l" t="t" r="r" b="b"/>
             <a:pathLst>
               <a:path w="5002" h="1801">
                 <a:moveTo>
@@ -2420,10 +2383,18 @@
         <p:txBody>
           <a:bodyPr wrap="none" lIns="90000" rIns="90000" tIns="45000" bIns="45000" anchor="ctr"/>
           <a:p>
-            <a:pPr algn="ctr"/>
+            <a:pPr algn="ctr">
+              <a:lnSpc>
+                <a:spcPct val="100000"/>
+              </a:lnSpc>
+            </a:pPr>
             <a:r>
               <a:rPr b="0" lang="pt-BR" sz="1800" spc="-1" strike="noStrike">
+                <a:solidFill>
+                  <a:srgbClr val="000000"/>
+                </a:solidFill>
                 <a:latin typeface="Arial"/>
+                <a:ea typeface="DejaVu Sans"/>
               </a:rPr>
               <a:t>inicio/fim</a:t>
             </a:r>
@@ -2435,14 +2406,14 @@
       </p:sp>
       <p:sp>
         <p:nvSpPr>
-          <p:cNvPr id="55" name="CustomShape 2"/>
+          <p:cNvPr id="52" name="CustomShape 2"/>
           <p:cNvSpPr/>
           <p:nvPr/>
         </p:nvSpPr>
         <p:spPr>
           <a:xfrm>
-            <a:off x="2448000" y="839160"/>
-            <a:ext cx="1872000" cy="636840"/>
+            <a:off x="2672640" y="880200"/>
+            <a:ext cx="1871640" cy="595440"/>
           </a:xfrm>
           <a:prstGeom prst="rect">
             <a:avLst/>
@@ -2465,10 +2436,18 @@
         <p:txBody>
           <a:bodyPr wrap="none" lIns="90000" rIns="90000" tIns="45000" bIns="45000" anchor="ctr"/>
           <a:p>
-            <a:pPr algn="ctr"/>
+            <a:pPr algn="ctr">
+              <a:lnSpc>
+                <a:spcPct val="100000"/>
+              </a:lnSpc>
+            </a:pPr>
             <a:r>
               <a:rPr b="0" lang="pt-BR" sz="1800" spc="-1" strike="noStrike">
+                <a:solidFill>
+                  <a:srgbClr val="000000"/>
+                </a:solidFill>
                 <a:latin typeface="Arial"/>
+                <a:ea typeface="DejaVu Sans"/>
               </a:rPr>
               <a:t>Entrada</a:t>
             </a:r>
@@ -2480,14 +2459,14 @@
       </p:sp>
       <p:sp>
         <p:nvSpPr>
-          <p:cNvPr id="56" name="CustomShape 3"/>
+          <p:cNvPr id="53" name="CustomShape 3"/>
           <p:cNvSpPr/>
           <p:nvPr/>
         </p:nvSpPr>
         <p:spPr>
           <a:xfrm>
             <a:off x="2088000" y="1908000"/>
-            <a:ext cx="2088000" cy="864000"/>
+            <a:ext cx="2087640" cy="863640"/>
           </a:xfrm>
           <a:prstGeom prst="rect">
             <a:avLst/>
@@ -2510,10 +2489,18 @@
         <p:txBody>
           <a:bodyPr wrap="none" lIns="90000" rIns="90000" tIns="45000" bIns="45000" anchor="ctr"/>
           <a:p>
-            <a:pPr algn="ctr"/>
+            <a:pPr algn="ctr">
+              <a:lnSpc>
+                <a:spcPct val="100000"/>
+              </a:lnSpc>
+            </a:pPr>
             <a:r>
               <a:rPr b="0" lang="pt-BR" sz="1800" spc="-1" strike="noStrike">
+                <a:solidFill>
+                  <a:srgbClr val="000000"/>
+                </a:solidFill>
                 <a:latin typeface="Arial"/>
+                <a:ea typeface="DejaVu Sans"/>
               </a:rPr>
               <a:t>Processamento</a:t>
             </a:r>
@@ -2525,14 +2512,14 @@
       </p:sp>
       <p:sp>
         <p:nvSpPr>
-          <p:cNvPr id="57" name="CustomShape 4"/>
+          <p:cNvPr id="54" name="CustomShape 4"/>
           <p:cNvSpPr/>
           <p:nvPr/>
         </p:nvSpPr>
         <p:spPr>
           <a:xfrm>
             <a:off x="2592000" y="3096000"/>
-            <a:ext cx="1224000" cy="792000"/>
+            <a:ext cx="1223640" cy="791640"/>
           </a:xfrm>
           <a:custGeom>
             <a:avLst/>
@@ -2578,59 +2565,57 @@
         <p:txBody>
           <a:bodyPr wrap="none" lIns="90000" rIns="90000" tIns="45000" bIns="45000" anchor="ctr"/>
           <a:p>
-            <a:pPr algn="ctr"/>
+            <a:pPr algn="ctr">
+              <a:lnSpc>
+                <a:spcPct val="100000"/>
+              </a:lnSpc>
+            </a:pPr>
             <a:r>
               <a:rPr b="0" lang="pt-BR" sz="1200" spc="-1" strike="noStrike">
+                <a:solidFill>
+                  <a:srgbClr val="000000"/>
+                </a:solidFill>
                 <a:latin typeface="Arial"/>
+                <a:ea typeface="DejaVu Sans"/>
               </a:rPr>
-              <a:t>De</a:t>
+              <a:t>Decisao</a:t>
             </a:r>
+            <a:endParaRPr b="0" lang="pt-BR" sz="1200" spc="-1" strike="noStrike">
+              <a:latin typeface="Arial"/>
+            </a:endParaRPr>
+          </a:p>
+          <a:p>
+            <a:pPr algn="ctr">
+              <a:lnSpc>
+                <a:spcPct val="100000"/>
+              </a:lnSpc>
+            </a:pPr>
             <a:r>
               <a:rPr b="0" lang="pt-BR" sz="1200" spc="-1" strike="noStrike">
+                <a:solidFill>
+                  <a:srgbClr val="000000"/>
+                </a:solidFill>
                 <a:latin typeface="Arial"/>
+                <a:ea typeface="DejaVu Sans"/>
               </a:rPr>
-              <a:t>cis</a:t>
-            </a:r>
-            <a:r>
-              <a:rPr b="0" lang="pt-BR" sz="1200" spc="-1" strike="noStrike">
-                <a:latin typeface="Arial"/>
-              </a:rPr>
-              <a:t>ao</a:t>
+              <a:t>If( ) { }</a:t>
             </a:r>
             <a:endParaRPr b="0" lang="pt-BR" sz="1200" spc="-1" strike="noStrike">
               <a:latin typeface="Arial"/>
             </a:endParaRPr>
           </a:p>
-          <a:p>
-            <a:pPr algn="ctr"/>
-            <a:r>
-              <a:rPr b="0" lang="pt-BR" sz="1200" spc="-1" strike="noStrike">
-                <a:latin typeface="Arial"/>
-              </a:rPr>
-              <a:t>If( ) </a:t>
-            </a:r>
-            <a:r>
-              <a:rPr b="0" lang="pt-BR" sz="1200" spc="-1" strike="noStrike">
-                <a:latin typeface="Arial"/>
-              </a:rPr>
-              <a:t>{ }</a:t>
-            </a:r>
-            <a:endParaRPr b="0" lang="pt-BR" sz="1200" spc="-1" strike="noStrike">
-              <a:latin typeface="Arial"/>
-            </a:endParaRPr>
-          </a:p>
-        </p:txBody>
-      </p:sp>
-      <p:sp>
-        <p:nvSpPr>
-          <p:cNvPr id="58" name="CustomShape 5"/>
+        </p:txBody>
+      </p:sp>
+      <p:sp>
+        <p:nvSpPr>
+          <p:cNvPr id="55" name="CustomShape 5"/>
           <p:cNvSpPr/>
           <p:nvPr/>
         </p:nvSpPr>
         <p:spPr>
           <a:xfrm>
             <a:off x="3780000" y="4356000"/>
-            <a:ext cx="1944000" cy="792000"/>
+            <a:ext cx="1943640" cy="791640"/>
           </a:xfrm>
           <a:prstGeom prst="foldedCorner">
             <a:avLst>
@@ -2655,10 +2640,18 @@
         <p:txBody>
           <a:bodyPr wrap="none" lIns="90000" rIns="90000" tIns="45000" bIns="45000" anchor="ctr"/>
           <a:p>
-            <a:pPr algn="ctr"/>
+            <a:pPr algn="ctr">
+              <a:lnSpc>
+                <a:spcPct val="100000"/>
+              </a:lnSpc>
+            </a:pPr>
             <a:r>
               <a:rPr b="0" lang="pt-BR" sz="1800" spc="-1" strike="noStrike">
+                <a:solidFill>
+                  <a:srgbClr val="000000"/>
+                </a:solidFill>
                 <a:latin typeface="Arial"/>
+                <a:ea typeface="DejaVu Sans"/>
               </a:rPr>
               <a:t>Saida</a:t>
             </a:r>
@@ -2670,28 +2663,28 @@
       </p:sp>
       <p:grpSp>
         <p:nvGrpSpPr>
-          <p:cNvPr id="59" name="Group 6"/>
+          <p:cNvPr id="56" name="Group 6"/>
           <p:cNvGrpSpPr/>
           <p:nvPr/>
         </p:nvGrpSpPr>
         <p:grpSpPr>
           <a:xfrm>
             <a:off x="6684120" y="1152000"/>
-            <a:ext cx="1739880" cy="418320"/>
+            <a:ext cx="1739520" cy="417960"/>
             <a:chOff x="6684120" y="1152000"/>
-            <a:chExt cx="1739880" cy="418320"/>
+            <a:chExt cx="1739520" cy="417960"/>
           </a:xfrm>
         </p:grpSpPr>
         <p:sp>
           <p:nvSpPr>
-            <p:cNvPr id="60" name="Line 7"/>
+            <p:cNvPr id="57" name="Line 7"/>
             <p:cNvSpPr/>
             <p:nvPr/>
           </p:nvSpPr>
           <p:spPr>
             <a:xfrm>
               <a:off x="6756120" y="1152000"/>
-              <a:ext cx="1584000" cy="0"/>
+              <a:ext cx="1584000" cy="360"/>
             </a:xfrm>
             <a:prstGeom prst="line">
               <a:avLst/>
@@ -2712,14 +2705,14 @@
         </p:sp>
         <p:sp>
           <p:nvSpPr>
-            <p:cNvPr id="61" name="TextShape 8"/>
-            <p:cNvSpPr txBox="1"/>
+            <p:cNvPr id="58" name="CustomShape 8"/>
+            <p:cNvSpPr/>
             <p:nvPr/>
           </p:nvSpPr>
           <p:spPr>
             <a:xfrm>
               <a:off x="6684120" y="1224000"/>
-              <a:ext cx="1739880" cy="346320"/>
+              <a:ext cx="1739520" cy="345960"/>
             </a:xfrm>
             <a:prstGeom prst="rect">
               <a:avLst/>
@@ -2729,9 +2722,20 @@
               <a:noFill/>
             </a:ln>
           </p:spPr>
+          <p:style>
+            <a:lnRef idx="0"/>
+            <a:fillRef idx="0"/>
+            <a:effectRef idx="0"/>
+            <a:fontRef idx="minor"/>
+          </p:style>
           <p:txBody>
             <a:bodyPr lIns="90000" rIns="90000" tIns="45000" bIns="45000"/>
             <a:p>
+              <a:pPr>
+                <a:lnSpc>
+                  <a:spcPct val="100000"/>
+                </a:lnSpc>
+              </a:pPr>
               <a:r>
                 <a:rPr b="0" lang="pt-BR" sz="1800" spc="-1" strike="noStrike">
                   <a:latin typeface="Arial"/>
@@ -2747,14 +2751,14 @@
       </p:grpSp>
       <p:sp>
         <p:nvSpPr>
-          <p:cNvPr id="62" name="Line 9"/>
+          <p:cNvPr id="59" name="Line 9"/>
           <p:cNvSpPr/>
           <p:nvPr/>
         </p:nvSpPr>
         <p:spPr>
           <a:xfrm>
             <a:off x="3240000" y="468000"/>
-            <a:ext cx="0" cy="432000"/>
+            <a:ext cx="360" cy="432000"/>
           </a:xfrm>
           <a:prstGeom prst="line">
             <a:avLst/>
@@ -2775,20 +2779,20 @@
       </p:sp>
       <p:sp>
         <p:nvSpPr>
-          <p:cNvPr id="63" name="CustomShape 10"/>
+          <p:cNvPr id="60" name="CustomShape 10"/>
           <p:cNvSpPr/>
           <p:nvPr/>
         </p:nvSpPr>
         <p:spPr>
           <a:xfrm>
             <a:off x="2304000" y="5904000"/>
-            <a:ext cx="1800000" cy="648000"/>
+            <a:ext cx="1799640" cy="647640"/>
           </a:xfrm>
           <a:custGeom>
             <a:avLst/>
             <a:gdLst/>
             <a:ahLst/>
-            <a:rect l="0" t="0" r="r" b="b"/>
+            <a:rect l="l" t="t" r="r" b="b"/>
             <a:pathLst>
               <a:path w="5002" h="1801">
                 <a:moveTo>
@@ -2847,10 +2851,18 @@
         <p:txBody>
           <a:bodyPr wrap="none" lIns="90000" rIns="90000" tIns="45000" bIns="45000" anchor="ctr"/>
           <a:p>
-            <a:pPr algn="ctr"/>
+            <a:pPr algn="ctr">
+              <a:lnSpc>
+                <a:spcPct val="100000"/>
+              </a:lnSpc>
+            </a:pPr>
             <a:r>
               <a:rPr b="0" lang="pt-BR" sz="1800" spc="-1" strike="noStrike">
+                <a:solidFill>
+                  <a:srgbClr val="000000"/>
+                </a:solidFill>
                 <a:latin typeface="Arial"/>
+                <a:ea typeface="DejaVu Sans"/>
               </a:rPr>
               <a:t>inicio/fim</a:t>
             </a:r>
@@ -2862,14 +2874,14 @@
       </p:sp>
       <p:sp>
         <p:nvSpPr>
-          <p:cNvPr id="64" name="Line 11"/>
+          <p:cNvPr id="61" name="Line 11"/>
           <p:cNvSpPr/>
           <p:nvPr/>
         </p:nvSpPr>
         <p:spPr>
           <a:xfrm>
             <a:off x="3240000" y="1512000"/>
-            <a:ext cx="0" cy="432000"/>
+            <a:ext cx="360" cy="432000"/>
           </a:xfrm>
           <a:prstGeom prst="line">
             <a:avLst/>
@@ -2890,14 +2902,14 @@
       </p:sp>
       <p:sp>
         <p:nvSpPr>
-          <p:cNvPr id="65" name="Line 12"/>
+          <p:cNvPr id="62" name="Line 12"/>
           <p:cNvSpPr/>
           <p:nvPr/>
         </p:nvSpPr>
         <p:spPr>
           <a:xfrm>
             <a:off x="3240000" y="2736000"/>
-            <a:ext cx="0" cy="432000"/>
+            <a:ext cx="360" cy="432000"/>
           </a:xfrm>
           <a:prstGeom prst="line">
             <a:avLst/>
@@ -2918,14 +2930,14 @@
       </p:sp>
       <p:sp>
         <p:nvSpPr>
-          <p:cNvPr id="66" name="Line 13"/>
+          <p:cNvPr id="63" name="Line 13"/>
           <p:cNvSpPr/>
           <p:nvPr/>
         </p:nvSpPr>
         <p:spPr>
           <a:xfrm>
             <a:off x="3816000" y="3456000"/>
-            <a:ext cx="864000" cy="0"/>
+            <a:ext cx="864000" cy="360"/>
           </a:xfrm>
           <a:prstGeom prst="line">
             <a:avLst/>
@@ -2945,14 +2957,14 @@
       </p:sp>
       <p:sp>
         <p:nvSpPr>
-          <p:cNvPr id="67" name="Line 14"/>
+          <p:cNvPr id="64" name="Line 14"/>
           <p:cNvSpPr/>
           <p:nvPr/>
         </p:nvSpPr>
         <p:spPr>
           <a:xfrm>
             <a:off x="1692000" y="3456000"/>
-            <a:ext cx="864000" cy="0"/>
+            <a:ext cx="864000" cy="360"/>
           </a:xfrm>
           <a:prstGeom prst="line">
             <a:avLst/>
@@ -2972,14 +2984,14 @@
       </p:sp>
       <p:sp>
         <p:nvSpPr>
-          <p:cNvPr id="68" name="Line 15"/>
+          <p:cNvPr id="65" name="Line 15"/>
           <p:cNvSpPr/>
           <p:nvPr/>
         </p:nvSpPr>
         <p:spPr>
           <a:xfrm>
             <a:off x="4680000" y="3456000"/>
-            <a:ext cx="0" cy="936000"/>
+            <a:ext cx="360" cy="936000"/>
           </a:xfrm>
           <a:prstGeom prst="line">
             <a:avLst/>
@@ -3000,14 +3012,14 @@
       </p:sp>
       <p:sp>
         <p:nvSpPr>
-          <p:cNvPr id="69" name="Line 16"/>
+          <p:cNvPr id="66" name="Line 16"/>
           <p:cNvSpPr/>
           <p:nvPr/>
         </p:nvSpPr>
         <p:spPr>
           <a:xfrm>
             <a:off x="1692000" y="3456000"/>
-            <a:ext cx="0" cy="936000"/>
+            <a:ext cx="360" cy="936000"/>
           </a:xfrm>
           <a:prstGeom prst="line">
             <a:avLst/>
@@ -3028,14 +3040,14 @@
       </p:sp>
       <p:sp>
         <p:nvSpPr>
-          <p:cNvPr id="70" name="CustomShape 17"/>
+          <p:cNvPr id="67" name="CustomShape 17"/>
           <p:cNvSpPr/>
           <p:nvPr/>
         </p:nvSpPr>
         <p:spPr>
           <a:xfrm>
             <a:off x="828360" y="4356360"/>
-            <a:ext cx="1944000" cy="792000"/>
+            <a:ext cx="1943640" cy="791640"/>
           </a:xfrm>
           <a:prstGeom prst="foldedCorner">
             <a:avLst>
@@ -3060,10 +3072,18 @@
         <p:txBody>
           <a:bodyPr wrap="none" lIns="90000" rIns="90000" tIns="45000" bIns="45000" anchor="ctr"/>
           <a:p>
-            <a:pPr algn="ctr"/>
+            <a:pPr algn="ctr">
+              <a:lnSpc>
+                <a:spcPct val="100000"/>
+              </a:lnSpc>
+            </a:pPr>
             <a:r>
               <a:rPr b="0" lang="pt-BR" sz="1800" spc="-1" strike="noStrike">
+                <a:solidFill>
+                  <a:srgbClr val="000000"/>
+                </a:solidFill>
                 <a:latin typeface="Arial"/>
+                <a:ea typeface="DejaVu Sans"/>
               </a:rPr>
               <a:t>Saida</a:t>
             </a:r>
@@ -3075,14 +3095,14 @@
       </p:sp>
       <p:sp>
         <p:nvSpPr>
-          <p:cNvPr id="71" name="Line 18"/>
+          <p:cNvPr id="68" name="Line 18"/>
           <p:cNvSpPr/>
           <p:nvPr/>
         </p:nvSpPr>
         <p:spPr>
           <a:xfrm>
             <a:off x="4680000" y="5148000"/>
-            <a:ext cx="0" cy="396000"/>
+            <a:ext cx="360" cy="396000"/>
           </a:xfrm>
           <a:prstGeom prst="line">
             <a:avLst/>
@@ -3102,14 +3122,14 @@
       </p:sp>
       <p:sp>
         <p:nvSpPr>
-          <p:cNvPr id="72" name="Line 19"/>
+          <p:cNvPr id="69" name="Line 19"/>
           <p:cNvSpPr/>
           <p:nvPr/>
         </p:nvSpPr>
         <p:spPr>
           <a:xfrm>
             <a:off x="1620000" y="5148000"/>
-            <a:ext cx="0" cy="396000"/>
+            <a:ext cx="360" cy="396000"/>
           </a:xfrm>
           <a:prstGeom prst="line">
             <a:avLst/>
@@ -3129,14 +3149,14 @@
       </p:sp>
       <p:sp>
         <p:nvSpPr>
-          <p:cNvPr id="73" name="Line 20"/>
+          <p:cNvPr id="70" name="Line 20"/>
           <p:cNvSpPr/>
           <p:nvPr/>
         </p:nvSpPr>
         <p:spPr>
           <a:xfrm flipH="1">
             <a:off x="3168000" y="5544000"/>
-            <a:ext cx="1512000" cy="0"/>
+            <a:ext cx="1512000" cy="360"/>
           </a:xfrm>
           <a:prstGeom prst="line">
             <a:avLst/>
@@ -3156,14 +3176,14 @@
       </p:sp>
       <p:sp>
         <p:nvSpPr>
-          <p:cNvPr id="74" name="Line 21"/>
+          <p:cNvPr id="71" name="Line 21"/>
           <p:cNvSpPr/>
           <p:nvPr/>
         </p:nvSpPr>
         <p:spPr>
           <a:xfrm flipH="1">
             <a:off x="1620000" y="5544000"/>
-            <a:ext cx="1512000" cy="0"/>
+            <a:ext cx="1512000" cy="360"/>
           </a:xfrm>
           <a:prstGeom prst="line">
             <a:avLst/>
@@ -3183,14 +3203,14 @@
       </p:sp>
       <p:sp>
         <p:nvSpPr>
-          <p:cNvPr id="75" name="Line 22"/>
+          <p:cNvPr id="72" name="Line 22"/>
           <p:cNvSpPr/>
           <p:nvPr/>
         </p:nvSpPr>
         <p:spPr>
           <a:xfrm>
             <a:off x="3168000" y="5508000"/>
-            <a:ext cx="0" cy="432000"/>
+            <a:ext cx="360" cy="432000"/>
           </a:xfrm>
           <a:prstGeom prst="line">
             <a:avLst/>

</xml_diff>